<commit_message>
Update to network figure
</commit_message>
<xml_diff>
--- a/PaperFigures/NetworkAndGUI.pptx
+++ b/PaperFigures/NetworkAndGUI.pptx
@@ -6096,10 +6096,10 @@
       </p:grpSp>
       <p:grpSp>
         <p:nvGrpSpPr>
-          <p:cNvPr id="1178" name="Group 1177">
+          <p:cNvPr id="2" name="Group 1">
             <a:extLst>
               <a:ext uri="{FF2B5EF4-FFF2-40B4-BE49-F238E27FC236}">
-                <a16:creationId xmlns:a16="http://schemas.microsoft.com/office/drawing/2014/main" id="{9A39D586-6B57-A0B4-C330-EB320470D2C8}"/>
+                <a16:creationId xmlns:a16="http://schemas.microsoft.com/office/drawing/2014/main" id="{E8739F58-3FA9-50F8-AE5C-925F15A06CAF}"/>
               </a:ext>
             </a:extLst>
           </p:cNvPr>
@@ -6108,47 +6108,18 @@
         </p:nvGrpSpPr>
         <p:grpSpPr>
           <a:xfrm>
-            <a:off x="445171" y="1258275"/>
-            <a:ext cx="13120157" cy="5361202"/>
-            <a:chOff x="845867" y="819824"/>
-            <a:chExt cx="10202638" cy="4246443"/>
+            <a:off x="-423389" y="2152797"/>
+            <a:ext cx="13988717" cy="5361202"/>
+            <a:chOff x="-423389" y="1258275"/>
+            <a:chExt cx="13988717" cy="5361202"/>
           </a:xfrm>
         </p:grpSpPr>
-        <p:pic>
-          <p:nvPicPr>
-            <p:cNvPr id="1172" name="Picture 1171" descr="A screenshot of a computer&#10;&#10;AI-generated content may be incorrect.">
+        <p:grpSp>
+          <p:nvGrpSpPr>
+            <p:cNvPr id="1178" name="Group 1177">
               <a:extLst>
                 <a:ext uri="{FF2B5EF4-FFF2-40B4-BE49-F238E27FC236}">
-                  <a16:creationId xmlns:a16="http://schemas.microsoft.com/office/drawing/2014/main" id="{839BABBE-C209-9914-A13C-1DE50D3811EF}"/>
-                </a:ext>
-              </a:extLst>
-            </p:cNvPr>
-            <p:cNvPicPr>
-              <a:picLocks noChangeAspect="1"/>
-            </p:cNvPicPr>
-            <p:nvPr/>
-          </p:nvPicPr>
-          <p:blipFill>
-            <a:blip r:embed="rId6"/>
-            <a:srcRect l="4491" r="84292"/>
-            <a:stretch/>
-          </p:blipFill>
-          <p:spPr>
-            <a:xfrm>
-              <a:off x="845867" y="819825"/>
-              <a:ext cx="1930514" cy="4245847"/>
-            </a:xfrm>
-            <a:prstGeom prst="rect">
-              <a:avLst/>
-            </a:prstGeom>
-          </p:spPr>
-        </p:pic>
-        <p:grpSp>
-          <p:nvGrpSpPr>
-            <p:cNvPr id="1177" name="Group 1176">
-              <a:extLst>
-                <a:ext uri="{FF2B5EF4-FFF2-40B4-BE49-F238E27FC236}">
-                  <a16:creationId xmlns:a16="http://schemas.microsoft.com/office/drawing/2014/main" id="{F829BBDC-1669-0431-EA2D-39398957FE71}"/>
+                  <a16:creationId xmlns:a16="http://schemas.microsoft.com/office/drawing/2014/main" id="{9A39D586-6B57-A0B4-C330-EB320470D2C8}"/>
                 </a:ext>
               </a:extLst>
             </p:cNvPr>
@@ -6157,18 +6128,18 @@
           </p:nvGrpSpPr>
           <p:grpSpPr>
             <a:xfrm>
-              <a:off x="2769875" y="819824"/>
-              <a:ext cx="8278630" cy="4246443"/>
-              <a:chOff x="3632200" y="820420"/>
-              <a:chExt cx="8278630" cy="4246443"/>
+              <a:off x="445171" y="1258275"/>
+              <a:ext cx="13120157" cy="5361202"/>
+              <a:chOff x="845867" y="819824"/>
+              <a:chExt cx="10202638" cy="4246443"/>
             </a:xfrm>
           </p:grpSpPr>
           <p:pic>
             <p:nvPicPr>
-              <p:cNvPr id="1173" name="Picture 1172" descr="A screenshot of a computer&#10;&#10;AI-generated content may be incorrect.">
+              <p:cNvPr id="1172" name="Picture 1171" descr="A screenshot of a computer&#10;&#10;AI-generated content may be incorrect.">
                 <a:extLst>
                   <a:ext uri="{FF2B5EF4-FFF2-40B4-BE49-F238E27FC236}">
-                    <a16:creationId xmlns:a16="http://schemas.microsoft.com/office/drawing/2014/main" id="{C47568B4-873A-5E4E-9744-6876A9BB1470}"/>
+                    <a16:creationId xmlns:a16="http://schemas.microsoft.com/office/drawing/2014/main" id="{839BABBE-C209-9914-A13C-1DE50D3811EF}"/>
                   </a:ext>
                 </a:extLst>
               </p:cNvPr>
@@ -6179,320 +6150,292 @@
             </p:nvPicPr>
             <p:blipFill>
               <a:blip r:embed="rId6"/>
-              <a:srcRect l="48381" t="9348" r="29632"/>
+              <a:srcRect l="4491" r="84292"/>
               <a:stretch/>
             </p:blipFill>
             <p:spPr>
               <a:xfrm>
-                <a:off x="3632200" y="821016"/>
-                <a:ext cx="4174067" cy="4245847"/>
+                <a:off x="845867" y="819825"/>
+                <a:ext cx="1930514" cy="4245847"/>
               </a:xfrm>
               <a:prstGeom prst="rect">
                 <a:avLst/>
               </a:prstGeom>
             </p:spPr>
           </p:pic>
-          <p:pic>
-            <p:nvPicPr>
-              <p:cNvPr id="1176" name="Picture 1175" descr="A screenshot of a computer&#10;&#10;AI-generated content may be incorrect.">
+          <p:grpSp>
+            <p:nvGrpSpPr>
+              <p:cNvPr id="1177" name="Group 1176">
                 <a:extLst>
                   <a:ext uri="{FF2B5EF4-FFF2-40B4-BE49-F238E27FC236}">
-                    <a16:creationId xmlns:a16="http://schemas.microsoft.com/office/drawing/2014/main" id="{69A67BEE-754C-291C-C0A7-3A7E6FEBCF1D}"/>
+                    <a16:creationId xmlns:a16="http://schemas.microsoft.com/office/drawing/2014/main" id="{F829BBDC-1669-0431-EA2D-39398957FE71}"/>
                   </a:ext>
                 </a:extLst>
               </p:cNvPr>
-              <p:cNvPicPr>
-                <a:picLocks noChangeAspect="1"/>
-              </p:cNvPicPr>
+              <p:cNvGrpSpPr/>
               <p:nvPr/>
-            </p:nvPicPr>
-            <p:blipFill>
-              <a:blip r:embed="rId6"/>
-              <a:srcRect l="76445" t="9348" r="1569"/>
-              <a:stretch/>
-            </p:blipFill>
-            <p:spPr>
+            </p:nvGrpSpPr>
+            <p:grpSpPr>
               <a:xfrm>
-                <a:off x="7736763" y="820420"/>
-                <a:ext cx="4174067" cy="4245847"/>
+                <a:off x="2769875" y="819824"/>
+                <a:ext cx="8278630" cy="4246443"/>
+                <a:chOff x="3632200" y="820420"/>
+                <a:chExt cx="8278630" cy="4246443"/>
               </a:xfrm>
-              <a:prstGeom prst="rect">
-                <a:avLst/>
-              </a:prstGeom>
-            </p:spPr>
-          </p:pic>
+            </p:grpSpPr>
+            <p:pic>
+              <p:nvPicPr>
+                <p:cNvPr id="1173" name="Picture 1172" descr="A screenshot of a computer&#10;&#10;AI-generated content may be incorrect.">
+                  <a:extLst>
+                    <a:ext uri="{FF2B5EF4-FFF2-40B4-BE49-F238E27FC236}">
+                      <a16:creationId xmlns:a16="http://schemas.microsoft.com/office/drawing/2014/main" id="{C47568B4-873A-5E4E-9744-6876A9BB1470}"/>
+                    </a:ext>
+                  </a:extLst>
+                </p:cNvPr>
+                <p:cNvPicPr>
+                  <a:picLocks noChangeAspect="1"/>
+                </p:cNvPicPr>
+                <p:nvPr/>
+              </p:nvPicPr>
+              <p:blipFill>
+                <a:blip r:embed="rId6"/>
+                <a:srcRect l="48381" t="9348" r="29632"/>
+                <a:stretch/>
+              </p:blipFill>
+              <p:spPr>
+                <a:xfrm>
+                  <a:off x="3632200" y="821016"/>
+                  <a:ext cx="4174067" cy="4245847"/>
+                </a:xfrm>
+                <a:prstGeom prst="rect">
+                  <a:avLst/>
+                </a:prstGeom>
+              </p:spPr>
+            </p:pic>
+            <p:pic>
+              <p:nvPicPr>
+                <p:cNvPr id="1176" name="Picture 1175" descr="A screenshot of a computer&#10;&#10;AI-generated content may be incorrect.">
+                  <a:extLst>
+                    <a:ext uri="{FF2B5EF4-FFF2-40B4-BE49-F238E27FC236}">
+                      <a16:creationId xmlns:a16="http://schemas.microsoft.com/office/drawing/2014/main" id="{69A67BEE-754C-291C-C0A7-3A7E6FEBCF1D}"/>
+                    </a:ext>
+                  </a:extLst>
+                </p:cNvPr>
+                <p:cNvPicPr>
+                  <a:picLocks noChangeAspect="1"/>
+                </p:cNvPicPr>
+                <p:nvPr/>
+              </p:nvPicPr>
+              <p:blipFill>
+                <a:blip r:embed="rId6"/>
+                <a:srcRect l="76445" t="9348" r="1569"/>
+                <a:stretch/>
+              </p:blipFill>
+              <p:spPr>
+                <a:xfrm>
+                  <a:off x="7736763" y="820420"/>
+                  <a:ext cx="4174067" cy="4245847"/>
+                </a:xfrm>
+                <a:prstGeom prst="rect">
+                  <a:avLst/>
+                </a:prstGeom>
+              </p:spPr>
+            </p:pic>
+          </p:grpSp>
         </p:grpSp>
+        <p:cxnSp>
+          <p:nvCxnSpPr>
+            <p:cNvPr id="1181" name="Straight Arrow Connector 1180">
+              <a:extLst>
+                <a:ext uri="{FF2B5EF4-FFF2-40B4-BE49-F238E27FC236}">
+                  <a16:creationId xmlns:a16="http://schemas.microsoft.com/office/drawing/2014/main" id="{ECBABF26-A52F-B2B0-295F-CA9E3664E75B}"/>
+                </a:ext>
+              </a:extLst>
+            </p:cNvPr>
+            <p:cNvCxnSpPr>
+              <a:cxnSpLocks/>
+            </p:cNvCxnSpPr>
+            <p:nvPr/>
+          </p:nvCxnSpPr>
+          <p:spPr>
+            <a:xfrm flipV="1">
+              <a:off x="1755291" y="2946753"/>
+              <a:ext cx="3" cy="940054"/>
+            </a:xfrm>
+            <a:prstGeom prst="straightConnector1">
+              <a:avLst/>
+            </a:prstGeom>
+            <a:ln w="57150">
+              <a:solidFill>
+                <a:schemeClr val="bg1"/>
+              </a:solidFill>
+              <a:tailEnd type="triangle"/>
+            </a:ln>
+          </p:spPr>
+          <p:style>
+            <a:lnRef idx="2">
+              <a:schemeClr val="accent1"/>
+            </a:lnRef>
+            <a:fillRef idx="0">
+              <a:schemeClr val="accent1"/>
+            </a:fillRef>
+            <a:effectRef idx="1">
+              <a:schemeClr val="accent1"/>
+            </a:effectRef>
+            <a:fontRef idx="minor">
+              <a:schemeClr val="tx1"/>
+            </a:fontRef>
+          </p:style>
+        </p:cxnSp>
+        <p:sp>
+          <p:nvSpPr>
+            <p:cNvPr id="1183" name="TextBox 1182">
+              <a:extLst>
+                <a:ext uri="{FF2B5EF4-FFF2-40B4-BE49-F238E27FC236}">
+                  <a16:creationId xmlns:a16="http://schemas.microsoft.com/office/drawing/2014/main" id="{1A3761FF-845E-81DA-A8BC-DF492FE71977}"/>
+                </a:ext>
+              </a:extLst>
+            </p:cNvPr>
+            <p:cNvSpPr txBox="1"/>
+            <p:nvPr/>
+          </p:nvSpPr>
+          <p:spPr>
+            <a:xfrm>
+              <a:off x="-423389" y="3882209"/>
+              <a:ext cx="4357359" cy="769441"/>
+            </a:xfrm>
+            <a:prstGeom prst="rect">
+              <a:avLst/>
+            </a:prstGeom>
+            <a:noFill/>
+            <a:ln>
+              <a:noFill/>
+            </a:ln>
+          </p:spPr>
+          <p:txBody>
+            <a:bodyPr wrap="square" rtlCol="0">
+              <a:spAutoFit/>
+            </a:bodyPr>
+            <a:lstStyle/>
+            <a:p>
+              <a:pPr algn="ctr"/>
+              <a:r>
+                <a:rPr lang="en-CA" sz="4400" b="1" dirty="0">
+                  <a:solidFill>
+                    <a:schemeClr val="bg1"/>
+                  </a:solidFill>
+                  <a:latin typeface="Times New Roman" panose="02020603050405020304" pitchFamily="18" charset="0"/>
+                  <a:cs typeface="Times New Roman" panose="02020603050405020304" pitchFamily="18" charset="0"/>
+                </a:rPr>
+                <a:t>UI</a:t>
+              </a:r>
+            </a:p>
+          </p:txBody>
+        </p:sp>
+        <p:cxnSp>
+          <p:nvCxnSpPr>
+            <p:cNvPr id="1184" name="Straight Arrow Connector 1183">
+              <a:extLst>
+                <a:ext uri="{FF2B5EF4-FFF2-40B4-BE49-F238E27FC236}">
+                  <a16:creationId xmlns:a16="http://schemas.microsoft.com/office/drawing/2014/main" id="{49FC5679-4FA1-5DB7-92E5-85E3EAE946BB}"/>
+                </a:ext>
+              </a:extLst>
+            </p:cNvPr>
+            <p:cNvCxnSpPr>
+              <a:cxnSpLocks/>
+            </p:cNvCxnSpPr>
+            <p:nvPr/>
+          </p:nvCxnSpPr>
+          <p:spPr>
+            <a:xfrm flipH="1">
+              <a:off x="7360146" y="5570430"/>
+              <a:ext cx="970871" cy="0"/>
+            </a:xfrm>
+            <a:prstGeom prst="straightConnector1">
+              <a:avLst/>
+            </a:prstGeom>
+            <a:ln w="57150">
+              <a:solidFill>
+                <a:schemeClr val="bg1"/>
+              </a:solidFill>
+              <a:headEnd type="triangle"/>
+              <a:tailEnd type="triangle"/>
+            </a:ln>
+          </p:spPr>
+          <p:style>
+            <a:lnRef idx="2">
+              <a:schemeClr val="accent1"/>
+            </a:lnRef>
+            <a:fillRef idx="0">
+              <a:schemeClr val="accent1"/>
+            </a:fillRef>
+            <a:effectRef idx="1">
+              <a:schemeClr val="accent1"/>
+            </a:effectRef>
+            <a:fontRef idx="minor">
+              <a:schemeClr val="tx1"/>
+            </a:fontRef>
+          </p:style>
+        </p:cxnSp>
+        <p:sp>
+          <p:nvSpPr>
+            <p:cNvPr id="1186" name="TextBox 1185">
+              <a:extLst>
+                <a:ext uri="{FF2B5EF4-FFF2-40B4-BE49-F238E27FC236}">
+                  <a16:creationId xmlns:a16="http://schemas.microsoft.com/office/drawing/2014/main" id="{D523F1AB-12FD-1C01-D32B-DCC53AEDF28B}"/>
+                </a:ext>
+              </a:extLst>
+            </p:cNvPr>
+            <p:cNvSpPr txBox="1"/>
+            <p:nvPr/>
+          </p:nvSpPr>
+          <p:spPr>
+            <a:xfrm>
+              <a:off x="5705811" y="3996317"/>
+              <a:ext cx="4357359" cy="1446550"/>
+            </a:xfrm>
+            <a:prstGeom prst="rect">
+              <a:avLst/>
+            </a:prstGeom>
+            <a:noFill/>
+            <a:ln>
+              <a:noFill/>
+            </a:ln>
+          </p:spPr>
+          <p:txBody>
+            <a:bodyPr wrap="square" rtlCol="0">
+              <a:spAutoFit/>
+            </a:bodyPr>
+            <a:lstStyle/>
+            <a:p>
+              <a:pPr algn="ctr"/>
+              <a:r>
+                <a:rPr lang="en-CA" sz="4400" b="1" dirty="0">
+                  <a:solidFill>
+                    <a:schemeClr val="bg1"/>
+                  </a:solidFill>
+                  <a:latin typeface="Times New Roman" panose="02020603050405020304" pitchFamily="18" charset="0"/>
+                  <a:cs typeface="Times New Roman" panose="02020603050405020304" pitchFamily="18" charset="0"/>
+                </a:rPr>
+                <a:t>Disparity</a:t>
+              </a:r>
+            </a:p>
+            <a:p>
+              <a:pPr algn="ctr"/>
+              <a:r>
+                <a:rPr lang="en-CA" sz="4400" b="1" dirty="0">
+                  <a:solidFill>
+                    <a:schemeClr val="bg1"/>
+                  </a:solidFill>
+                  <a:latin typeface="Times New Roman" panose="02020603050405020304" pitchFamily="18" charset="0"/>
+                  <a:cs typeface="Times New Roman" panose="02020603050405020304" pitchFamily="18" charset="0"/>
+                </a:rPr>
+                <a:t>Adjust</a:t>
+              </a:r>
+            </a:p>
+          </p:txBody>
+        </p:sp>
       </p:grpSp>
-      <p:sp>
-        <p:nvSpPr>
-          <p:cNvPr id="1179" name="TextBox 1178">
-            <a:extLst>
-              <a:ext uri="{FF2B5EF4-FFF2-40B4-BE49-F238E27FC236}">
-                <a16:creationId xmlns:a16="http://schemas.microsoft.com/office/drawing/2014/main" id="{41B4B0AF-AAD7-6372-1E5B-8BA3BB8E9BA9}"/>
-              </a:ext>
-            </a:extLst>
-          </p:cNvPr>
-          <p:cNvSpPr txBox="1"/>
-          <p:nvPr/>
-        </p:nvSpPr>
-        <p:spPr>
-          <a:xfrm>
-            <a:off x="291989" y="391632"/>
-            <a:ext cx="837925" cy="769441"/>
-          </a:xfrm>
-          <a:prstGeom prst="rect">
-            <a:avLst/>
-          </a:prstGeom>
-          <a:noFill/>
-        </p:spPr>
-        <p:txBody>
-          <a:bodyPr wrap="square" rtlCol="0">
-            <a:spAutoFit/>
-          </a:bodyPr>
-          <a:lstStyle/>
-          <a:p>
-            <a:pPr algn="ctr"/>
-            <a:r>
-              <a:rPr lang="en-CA" sz="4400" b="1" dirty="0">
-                <a:latin typeface="Times New Roman" panose="02020603050405020304" pitchFamily="18" charset="0"/>
-                <a:cs typeface="Times New Roman" panose="02020603050405020304" pitchFamily="18" charset="0"/>
-              </a:rPr>
-              <a:t>a)</a:t>
-            </a:r>
-          </a:p>
-        </p:txBody>
-      </p:sp>
-      <p:sp>
-        <p:nvSpPr>
-          <p:cNvPr id="1180" name="TextBox 1179">
-            <a:extLst>
-              <a:ext uri="{FF2B5EF4-FFF2-40B4-BE49-F238E27FC236}">
-                <a16:creationId xmlns:a16="http://schemas.microsoft.com/office/drawing/2014/main" id="{ABEF5C08-2520-FB75-C349-F6C620B15079}"/>
-              </a:ext>
-            </a:extLst>
-          </p:cNvPr>
-          <p:cNvSpPr txBox="1"/>
-          <p:nvPr/>
-        </p:nvSpPr>
-        <p:spPr>
-          <a:xfrm>
-            <a:off x="158274" y="7070744"/>
-            <a:ext cx="1105353" cy="769441"/>
-          </a:xfrm>
-          <a:prstGeom prst="rect">
-            <a:avLst/>
-          </a:prstGeom>
-          <a:noFill/>
-        </p:spPr>
-        <p:txBody>
-          <a:bodyPr wrap="square" rtlCol="0">
-            <a:spAutoFit/>
-          </a:bodyPr>
-          <a:lstStyle/>
-          <a:p>
-            <a:pPr algn="ctr"/>
-            <a:r>
-              <a:rPr lang="en-CA" sz="4400" b="1" dirty="0">
-                <a:latin typeface="Times New Roman" panose="02020603050405020304" pitchFamily="18" charset="0"/>
-                <a:cs typeface="Times New Roman" panose="02020603050405020304" pitchFamily="18" charset="0"/>
-              </a:rPr>
-              <a:t>b)</a:t>
-            </a:r>
-          </a:p>
-        </p:txBody>
-      </p:sp>
-      <p:cxnSp>
-        <p:nvCxnSpPr>
-          <p:cNvPr id="1181" name="Straight Arrow Connector 1180">
-            <a:extLst>
-              <a:ext uri="{FF2B5EF4-FFF2-40B4-BE49-F238E27FC236}">
-                <a16:creationId xmlns:a16="http://schemas.microsoft.com/office/drawing/2014/main" id="{ECBABF26-A52F-B2B0-295F-CA9E3664E75B}"/>
-              </a:ext>
-            </a:extLst>
-          </p:cNvPr>
-          <p:cNvCxnSpPr>
-            <a:cxnSpLocks/>
-          </p:cNvCxnSpPr>
-          <p:nvPr/>
-        </p:nvCxnSpPr>
-        <p:spPr>
-          <a:xfrm flipV="1">
-            <a:off x="1755291" y="2946753"/>
-            <a:ext cx="3" cy="940054"/>
-          </a:xfrm>
-          <a:prstGeom prst="straightConnector1">
-            <a:avLst/>
-          </a:prstGeom>
-          <a:ln w="57150">
-            <a:solidFill>
-              <a:schemeClr val="bg1"/>
-            </a:solidFill>
-            <a:tailEnd type="triangle"/>
-          </a:ln>
-        </p:spPr>
-        <p:style>
-          <a:lnRef idx="2">
-            <a:schemeClr val="accent1"/>
-          </a:lnRef>
-          <a:fillRef idx="0">
-            <a:schemeClr val="accent1"/>
-          </a:fillRef>
-          <a:effectRef idx="1">
-            <a:schemeClr val="accent1"/>
-          </a:effectRef>
-          <a:fontRef idx="minor">
-            <a:schemeClr val="tx1"/>
-          </a:fontRef>
-        </p:style>
-      </p:cxnSp>
-      <p:sp>
-        <p:nvSpPr>
-          <p:cNvPr id="1183" name="TextBox 1182">
-            <a:extLst>
-              <a:ext uri="{FF2B5EF4-FFF2-40B4-BE49-F238E27FC236}">
-                <a16:creationId xmlns:a16="http://schemas.microsoft.com/office/drawing/2014/main" id="{1A3761FF-845E-81DA-A8BC-DF492FE71977}"/>
-              </a:ext>
-            </a:extLst>
-          </p:cNvPr>
-          <p:cNvSpPr txBox="1"/>
-          <p:nvPr/>
-        </p:nvSpPr>
-        <p:spPr>
-          <a:xfrm>
-            <a:off x="-423389" y="3882209"/>
-            <a:ext cx="4357359" cy="769441"/>
-          </a:xfrm>
-          <a:prstGeom prst="rect">
-            <a:avLst/>
-          </a:prstGeom>
-          <a:noFill/>
-          <a:ln>
-            <a:noFill/>
-          </a:ln>
-        </p:spPr>
-        <p:txBody>
-          <a:bodyPr wrap="square" rtlCol="0">
-            <a:spAutoFit/>
-          </a:bodyPr>
-          <a:lstStyle/>
-          <a:p>
-            <a:pPr algn="ctr"/>
-            <a:r>
-              <a:rPr lang="en-CA" sz="4400" b="1" dirty="0">
-                <a:solidFill>
-                  <a:schemeClr val="bg1"/>
-                </a:solidFill>
-                <a:latin typeface="Times New Roman" panose="02020603050405020304" pitchFamily="18" charset="0"/>
-                <a:cs typeface="Times New Roman" panose="02020603050405020304" pitchFamily="18" charset="0"/>
-              </a:rPr>
-              <a:t>UI</a:t>
-            </a:r>
-          </a:p>
-        </p:txBody>
-      </p:sp>
-      <p:cxnSp>
-        <p:nvCxnSpPr>
-          <p:cNvPr id="1184" name="Straight Arrow Connector 1183">
-            <a:extLst>
-              <a:ext uri="{FF2B5EF4-FFF2-40B4-BE49-F238E27FC236}">
-                <a16:creationId xmlns:a16="http://schemas.microsoft.com/office/drawing/2014/main" id="{49FC5679-4FA1-5DB7-92E5-85E3EAE946BB}"/>
-              </a:ext>
-            </a:extLst>
-          </p:cNvPr>
-          <p:cNvCxnSpPr>
-            <a:cxnSpLocks/>
-          </p:cNvCxnSpPr>
-          <p:nvPr/>
-        </p:nvCxnSpPr>
-        <p:spPr>
-          <a:xfrm flipH="1">
-            <a:off x="7360146" y="5570430"/>
-            <a:ext cx="970871" cy="0"/>
-          </a:xfrm>
-          <a:prstGeom prst="straightConnector1">
-            <a:avLst/>
-          </a:prstGeom>
-          <a:ln w="57150">
-            <a:solidFill>
-              <a:schemeClr val="bg1"/>
-            </a:solidFill>
-            <a:headEnd type="triangle"/>
-            <a:tailEnd type="triangle"/>
-          </a:ln>
-        </p:spPr>
-        <p:style>
-          <a:lnRef idx="2">
-            <a:schemeClr val="accent1"/>
-          </a:lnRef>
-          <a:fillRef idx="0">
-            <a:schemeClr val="accent1"/>
-          </a:fillRef>
-          <a:effectRef idx="1">
-            <a:schemeClr val="accent1"/>
-          </a:effectRef>
-          <a:fontRef idx="minor">
-            <a:schemeClr val="tx1"/>
-          </a:fontRef>
-        </p:style>
-      </p:cxnSp>
-      <p:sp>
-        <p:nvSpPr>
-          <p:cNvPr id="1186" name="TextBox 1185">
-            <a:extLst>
-              <a:ext uri="{FF2B5EF4-FFF2-40B4-BE49-F238E27FC236}">
-                <a16:creationId xmlns:a16="http://schemas.microsoft.com/office/drawing/2014/main" id="{D523F1AB-12FD-1C01-D32B-DCC53AEDF28B}"/>
-              </a:ext>
-            </a:extLst>
-          </p:cNvPr>
-          <p:cNvSpPr txBox="1"/>
-          <p:nvPr/>
-        </p:nvSpPr>
-        <p:spPr>
-          <a:xfrm>
-            <a:off x="5705811" y="3996317"/>
-            <a:ext cx="4357359" cy="1446550"/>
-          </a:xfrm>
-          <a:prstGeom prst="rect">
-            <a:avLst/>
-          </a:prstGeom>
-          <a:noFill/>
-          <a:ln>
-            <a:noFill/>
-          </a:ln>
-        </p:spPr>
-        <p:txBody>
-          <a:bodyPr wrap="square" rtlCol="0">
-            <a:spAutoFit/>
-          </a:bodyPr>
-          <a:lstStyle/>
-          <a:p>
-            <a:pPr algn="ctr"/>
-            <a:r>
-              <a:rPr lang="en-CA" sz="4400" b="1" dirty="0">
-                <a:solidFill>
-                  <a:schemeClr val="bg1"/>
-                </a:solidFill>
-                <a:latin typeface="Times New Roman" panose="02020603050405020304" pitchFamily="18" charset="0"/>
-                <a:cs typeface="Times New Roman" panose="02020603050405020304" pitchFamily="18" charset="0"/>
-              </a:rPr>
-              <a:t>Disparity</a:t>
-            </a:r>
-          </a:p>
-          <a:p>
-            <a:pPr algn="ctr"/>
-            <a:r>
-              <a:rPr lang="en-CA" sz="4400" b="1" dirty="0">
-                <a:solidFill>
-                  <a:schemeClr val="bg1"/>
-                </a:solidFill>
-                <a:latin typeface="Times New Roman" panose="02020603050405020304" pitchFamily="18" charset="0"/>
-                <a:cs typeface="Times New Roman" panose="02020603050405020304" pitchFamily="18" charset="0"/>
-              </a:rPr>
-              <a:t>Adjust</a:t>
-            </a:r>
-          </a:p>
-        </p:txBody>
-      </p:sp>
       <p:sp>
         <p:nvSpPr>
           <p:cNvPr id="16" name="TextBox 15">

</xml_diff>